<commit_message>
Updated slides, additional viz, links to Tableau Public dashboards
</commit_message>
<xml_diff>
--- a/PresentationSlides.pptx
+++ b/PresentationSlides.pptx
@@ -916,7 +916,7 @@
               </a:spcAft>
               <a:buNone/>
             </a:pPr>
-            <a:endParaRPr/>
+            <a:endParaRPr dirty="0"/>
           </a:p>
         </p:txBody>
       </p:sp>
@@ -7183,14 +7183,14 @@
               <a:buNone/>
             </a:pPr>
             <a:r>
-              <a:rPr lang="en">
+              <a:rPr lang="en" dirty="0">
                 <a:solidFill>
                   <a:schemeClr val="lt1"/>
                 </a:solidFill>
               </a:rPr>
               <a:t>The Team</a:t>
             </a:r>
-            <a:endParaRPr>
+            <a:endParaRPr dirty="0">
               <a:solidFill>
                 <a:schemeClr val="lt1"/>
               </a:solidFill>
@@ -8025,6 +8025,121 @@
               </a:rPr>
               <a:t>Angela Silveira</a:t>
             </a:r>
+          </a:p>
+        </p:txBody>
+      </p:sp>
+      <p:sp>
+        <p:nvSpPr>
+          <p:cNvPr id="2" name="TextBox 1">
+            <a:extLst>
+              <a:ext uri="{FF2B5EF4-FFF2-40B4-BE49-F238E27FC236}">
+                <a16:creationId xmlns:a16="http://schemas.microsoft.com/office/drawing/2014/main" id="{5EC128D0-DC0C-714C-9B22-F82DDFE74C1C}"/>
+              </a:ext>
+            </a:extLst>
+          </p:cNvPr>
+          <p:cNvSpPr txBox="1"/>
+          <p:nvPr/>
+        </p:nvSpPr>
+        <p:spPr>
+          <a:xfrm>
+            <a:off x="228600" y="3922299"/>
+            <a:ext cx="8686800" cy="1169551"/>
+          </a:xfrm>
+          <a:prstGeom prst="rect">
+            <a:avLst/>
+          </a:prstGeom>
+          <a:noFill/>
+        </p:spPr>
+        <p:txBody>
+          <a:bodyPr wrap="square" rtlCol="0">
+            <a:spAutoFit/>
+          </a:bodyPr>
+          <a:lstStyle/>
+          <a:p>
+            <a:pPr lvl="0"/>
+            <a:r>
+              <a:rPr lang="en-US" dirty="0">
+                <a:solidFill>
+                  <a:schemeClr val="bg1">
+                    <a:lumMod val="40000"/>
+                    <a:lumOff val="60000"/>
+                  </a:schemeClr>
+                </a:solidFill>
+              </a:rPr>
+              <a:t>How we chose approached this project:</a:t>
+            </a:r>
+          </a:p>
+          <a:p>
+            <a:pPr marL="171450" lvl="0" indent="-171450">
+              <a:buFontTx/>
+              <a:buChar char="-"/>
+            </a:pPr>
+            <a:r>
+              <a:rPr lang="en-US">
+                <a:solidFill>
+                  <a:schemeClr val="bg1">
+                    <a:lumMod val="40000"/>
+                    <a:lumOff val="60000"/>
+                  </a:schemeClr>
+                </a:solidFill>
+              </a:rPr>
+              <a:t>Multiple ideas </a:t>
+            </a:r>
+            <a:r>
+              <a:rPr lang="en-US" dirty="0">
+                <a:solidFill>
+                  <a:schemeClr val="bg1">
+                    <a:lumMod val="40000"/>
+                    <a:lumOff val="60000"/>
+                  </a:schemeClr>
+                </a:solidFill>
+              </a:rPr>
+              <a:t>identified</a:t>
+            </a:r>
+          </a:p>
+          <a:p>
+            <a:pPr marL="171450" lvl="0" indent="-171450">
+              <a:buFontTx/>
+              <a:buChar char="-"/>
+            </a:pPr>
+            <a:r>
+              <a:rPr lang="en-US" dirty="0">
+                <a:solidFill>
+                  <a:schemeClr val="bg1">
+                    <a:lumMod val="40000"/>
+                    <a:lumOff val="60000"/>
+                  </a:schemeClr>
+                </a:solidFill>
+              </a:rPr>
+              <a:t>Reviewed data available for each idea - some were ruled out as not being viable options</a:t>
+            </a:r>
+          </a:p>
+          <a:p>
+            <a:pPr marL="171450" lvl="0" indent="-171450">
+              <a:buFontTx/>
+              <a:buChar char="-"/>
+            </a:pPr>
+            <a:r>
+              <a:rPr lang="en-US" dirty="0">
+                <a:solidFill>
+                  <a:schemeClr val="bg1">
+                    <a:lumMod val="40000"/>
+                    <a:lumOff val="60000"/>
+                  </a:schemeClr>
+                </a:solidFill>
+              </a:rPr>
+              <a:t>Two datasets emerged as being robust &amp; relevant – COVID-19 and home sales</a:t>
+            </a:r>
+          </a:p>
+          <a:p>
+            <a:endParaRPr lang="en-US" dirty="0">
+              <a:solidFill>
+                <a:schemeClr val="bg1">
+                  <a:lumMod val="40000"/>
+                  <a:lumOff val="60000"/>
+                </a:schemeClr>
+              </a:solidFill>
+            </a:endParaRPr>
           </a:p>
         </p:txBody>
       </p:sp>

</xml_diff>